<commit_message>
setting up for flask deploy
</commit_message>
<xml_diff>
--- a/docs/etl_wordcount_flowchart.pptx
+++ b/docs/etl_wordcount_flowchart.pptx
@@ -259,7 +259,7 @@
           <a:p>
             <a:fld id="{91E4C2F8-EB44-4795-8BBB-46F7DEE81F5F}" type="datetimeFigureOut">
               <a:rPr lang="en-US" smtClean="0"/>
-              <a:t>12/27/2019</a:t>
+              <a:t>12/28/2019</a:t>
             </a:fld>
             <a:endParaRPr lang="en-US"/>
           </a:p>
@@ -457,7 +457,7 @@
           <a:p>
             <a:fld id="{91E4C2F8-EB44-4795-8BBB-46F7DEE81F5F}" type="datetimeFigureOut">
               <a:rPr lang="en-US" smtClean="0"/>
-              <a:t>12/27/2019</a:t>
+              <a:t>12/28/2019</a:t>
             </a:fld>
             <a:endParaRPr lang="en-US"/>
           </a:p>
@@ -665,7 +665,7 @@
           <a:p>
             <a:fld id="{91E4C2F8-EB44-4795-8BBB-46F7DEE81F5F}" type="datetimeFigureOut">
               <a:rPr lang="en-US" smtClean="0"/>
-              <a:t>12/27/2019</a:t>
+              <a:t>12/28/2019</a:t>
             </a:fld>
             <a:endParaRPr lang="en-US"/>
           </a:p>
@@ -863,7 +863,7 @@
           <a:p>
             <a:fld id="{91E4C2F8-EB44-4795-8BBB-46F7DEE81F5F}" type="datetimeFigureOut">
               <a:rPr lang="en-US" smtClean="0"/>
-              <a:t>12/27/2019</a:t>
+              <a:t>12/28/2019</a:t>
             </a:fld>
             <a:endParaRPr lang="en-US"/>
           </a:p>
@@ -1138,7 +1138,7 @@
           <a:p>
             <a:fld id="{91E4C2F8-EB44-4795-8BBB-46F7DEE81F5F}" type="datetimeFigureOut">
               <a:rPr lang="en-US" smtClean="0"/>
-              <a:t>12/27/2019</a:t>
+              <a:t>12/28/2019</a:t>
             </a:fld>
             <a:endParaRPr lang="en-US"/>
           </a:p>
@@ -1403,7 +1403,7 @@
           <a:p>
             <a:fld id="{91E4C2F8-EB44-4795-8BBB-46F7DEE81F5F}" type="datetimeFigureOut">
               <a:rPr lang="en-US" smtClean="0"/>
-              <a:t>12/27/2019</a:t>
+              <a:t>12/28/2019</a:t>
             </a:fld>
             <a:endParaRPr lang="en-US"/>
           </a:p>
@@ -1815,7 +1815,7 @@
           <a:p>
             <a:fld id="{91E4C2F8-EB44-4795-8BBB-46F7DEE81F5F}" type="datetimeFigureOut">
               <a:rPr lang="en-US" smtClean="0"/>
-              <a:t>12/27/2019</a:t>
+              <a:t>12/28/2019</a:t>
             </a:fld>
             <a:endParaRPr lang="en-US"/>
           </a:p>
@@ -1956,7 +1956,7 @@
           <a:p>
             <a:fld id="{91E4C2F8-EB44-4795-8BBB-46F7DEE81F5F}" type="datetimeFigureOut">
               <a:rPr lang="en-US" smtClean="0"/>
-              <a:t>12/27/2019</a:t>
+              <a:t>12/28/2019</a:t>
             </a:fld>
             <a:endParaRPr lang="en-US"/>
           </a:p>
@@ -2069,7 +2069,7 @@
           <a:p>
             <a:fld id="{91E4C2F8-EB44-4795-8BBB-46F7DEE81F5F}" type="datetimeFigureOut">
               <a:rPr lang="en-US" smtClean="0"/>
-              <a:t>12/27/2019</a:t>
+              <a:t>12/28/2019</a:t>
             </a:fld>
             <a:endParaRPr lang="en-US"/>
           </a:p>
@@ -2380,7 +2380,7 @@
           <a:p>
             <a:fld id="{91E4C2F8-EB44-4795-8BBB-46F7DEE81F5F}" type="datetimeFigureOut">
               <a:rPr lang="en-US" smtClean="0"/>
-              <a:t>12/27/2019</a:t>
+              <a:t>12/28/2019</a:t>
             </a:fld>
             <a:endParaRPr lang="en-US"/>
           </a:p>
@@ -2668,7 +2668,7 @@
           <a:p>
             <a:fld id="{91E4C2F8-EB44-4795-8BBB-46F7DEE81F5F}" type="datetimeFigureOut">
               <a:rPr lang="en-US" smtClean="0"/>
-              <a:t>12/27/2019</a:t>
+              <a:t>12/28/2019</a:t>
             </a:fld>
             <a:endParaRPr lang="en-US"/>
           </a:p>
@@ -2909,7 +2909,7 @@
           <a:p>
             <a:fld id="{91E4C2F8-EB44-4795-8BBB-46F7DEE81F5F}" type="datetimeFigureOut">
               <a:rPr lang="en-US" smtClean="0"/>
-              <a:t>12/27/2019</a:t>
+              <a:t>12/28/2019</a:t>
             </a:fld>
             <a:endParaRPr lang="en-US"/>
           </a:p>
@@ -3535,7 +3535,7 @@
         </p:nvGrpSpPr>
         <p:grpSpPr>
           <a:xfrm>
-            <a:off x="4763746" y="2737414"/>
+            <a:off x="4763746" y="2611904"/>
             <a:ext cx="1479176" cy="524127"/>
             <a:chOff x="2788024" y="887506"/>
             <a:chExt cx="1479176" cy="524127"/>
@@ -3642,7 +3642,7 @@
         <p:spPr>
           <a:xfrm>
             <a:off x="2236693" y="2328253"/>
-            <a:ext cx="2652559" cy="570526"/>
+            <a:ext cx="2652559" cy="445016"/>
           </a:xfrm>
           <a:prstGeom prst="bentConnector3">
             <a:avLst/>
@@ -3682,7 +3682,7 @@
         <p:spPr>
           <a:xfrm>
             <a:off x="2236693" y="2328253"/>
-            <a:ext cx="1133295" cy="741502"/>
+            <a:ext cx="1133295" cy="789438"/>
           </a:xfrm>
           <a:prstGeom prst="bentConnector3">
             <a:avLst/>
@@ -3717,10 +3717,10 @@
         </p:nvGrpSpPr>
         <p:grpSpPr>
           <a:xfrm>
-            <a:off x="3254604" y="2957696"/>
-            <a:ext cx="766482" cy="436721"/>
-            <a:chOff x="2788024" y="376517"/>
-            <a:chExt cx="833718" cy="436721"/>
+            <a:off x="3254604" y="2893040"/>
+            <a:ext cx="766482" cy="750005"/>
+            <a:chOff x="2788024" y="439125"/>
+            <a:chExt cx="833718" cy="374113"/>
           </a:xfrm>
         </p:grpSpPr>
         <p:sp>
@@ -3737,7 +3737,7 @@
           </p:nvSpPr>
           <p:spPr>
             <a:xfrm>
-              <a:off x="2913530" y="376517"/>
+              <a:off x="2913530" y="439125"/>
               <a:ext cx="304800" cy="224118"/>
             </a:xfrm>
             <a:prstGeom prst="flowChartMagneticDisk">
@@ -3874,8 +3874,8 @@
         </p:nvCxnSpPr>
         <p:spPr>
           <a:xfrm rot="5400000" flipH="1" flipV="1">
-            <a:off x="3392393" y="2573706"/>
-            <a:ext cx="819943" cy="329039"/>
+            <a:off x="3391777" y="2574322"/>
+            <a:ext cx="821175" cy="329039"/>
           </a:xfrm>
           <a:prstGeom prst="bentConnector2">
             <a:avLst/>
@@ -4187,7 +4187,7 @@
         <p:spPr>
           <a:xfrm flipV="1">
             <a:off x="5194052" y="2547888"/>
-            <a:ext cx="1923378" cy="350891"/>
+            <a:ext cx="1923378" cy="225381"/>
           </a:xfrm>
           <a:prstGeom prst="bentConnector2">
             <a:avLst/>
@@ -4464,8 +4464,8 @@
         </p:nvCxnSpPr>
         <p:spPr>
           <a:xfrm flipV="1">
-            <a:off x="2470304" y="3181814"/>
-            <a:ext cx="1039794" cy="1342792"/>
+            <a:off x="2470304" y="3342342"/>
+            <a:ext cx="1039794" cy="1182264"/>
           </a:xfrm>
           <a:prstGeom prst="bentConnector2">
             <a:avLst/>
@@ -4668,8 +4668,8 @@
         </p:nvCxnSpPr>
         <p:spPr>
           <a:xfrm>
-            <a:off x="5041652" y="3060144"/>
-            <a:ext cx="17254" cy="1164296"/>
+            <a:off x="5041652" y="2934634"/>
+            <a:ext cx="17254" cy="1289806"/>
           </a:xfrm>
           <a:prstGeom prst="straightConnector1">
             <a:avLst/>
@@ -4710,8 +4710,8 @@
         </p:nvCxnSpPr>
         <p:spPr>
           <a:xfrm rot="10800000">
-            <a:off x="3650208" y="3069756"/>
-            <a:ext cx="758229" cy="1374321"/>
+            <a:off x="3650208" y="3117692"/>
+            <a:ext cx="758229" cy="1326385"/>
           </a:xfrm>
           <a:prstGeom prst="bentConnector3">
             <a:avLst/>
@@ -4789,6 +4789,242 @@
           </a:p>
         </p:txBody>
       </p:sp>
+      <p:sp>
+        <p:nvSpPr>
+          <p:cNvPr id="37" name="Flowchart: Process 36">
+            <a:extLst>
+              <a:ext uri="{FF2B5EF4-FFF2-40B4-BE49-F238E27FC236}">
+                <a16:creationId xmlns:a16="http://schemas.microsoft.com/office/drawing/2014/main" id="{02799417-AA6E-47F8-8A0E-8980EB565391}"/>
+              </a:ext>
+            </a:extLst>
+          </p:cNvPr>
+          <p:cNvSpPr/>
+          <p:nvPr/>
+        </p:nvSpPr>
+        <p:spPr>
+          <a:xfrm>
+            <a:off x="6060132" y="4224440"/>
+            <a:ext cx="1300940" cy="439271"/>
+          </a:xfrm>
+          <a:prstGeom prst="flowChartProcess">
+            <a:avLst/>
+          </a:prstGeom>
+        </p:spPr>
+        <p:style>
+          <a:lnRef idx="2">
+            <a:schemeClr val="accent1">
+              <a:shade val="50000"/>
+            </a:schemeClr>
+          </a:lnRef>
+          <a:fillRef idx="1">
+            <a:schemeClr val="accent1"/>
+          </a:fillRef>
+          <a:effectRef idx="0">
+            <a:schemeClr val="accent1"/>
+          </a:effectRef>
+          <a:fontRef idx="minor">
+            <a:schemeClr val="lt1"/>
+          </a:fontRef>
+        </p:style>
+        <p:txBody>
+          <a:bodyPr rtlCol="0" anchor="ctr"/>
+          <a:lstStyle/>
+          <a:p>
+            <a:pPr algn="ctr"/>
+            <a:r>
+              <a:rPr lang="en-US" sz="1000" dirty="0"/>
+              <a:t>write_json_4grid.py</a:t>
+            </a:r>
+          </a:p>
+        </p:txBody>
+      </p:sp>
+      <p:cxnSp>
+        <p:nvCxnSpPr>
+          <p:cNvPr id="24" name="Connector: Elbow 23">
+            <a:extLst>
+              <a:ext uri="{FF2B5EF4-FFF2-40B4-BE49-F238E27FC236}">
+                <a16:creationId xmlns:a16="http://schemas.microsoft.com/office/drawing/2014/main" id="{2293DAF6-91B5-48D9-91EB-8B0ABCDFDAFC}"/>
+              </a:ext>
+            </a:extLst>
+          </p:cNvPr>
+          <p:cNvCxnSpPr>
+            <a:stCxn id="4" idx="4"/>
+            <a:endCxn id="37" idx="0"/>
+          </p:cNvCxnSpPr>
+          <p:nvPr/>
+        </p:nvCxnSpPr>
+        <p:spPr>
+          <a:xfrm>
+            <a:off x="3650207" y="3117691"/>
+            <a:ext cx="3060395" cy="1106749"/>
+          </a:xfrm>
+          <a:prstGeom prst="bentConnector2">
+            <a:avLst/>
+          </a:prstGeom>
+          <a:ln>
+            <a:tailEnd type="triangle"/>
+          </a:ln>
+        </p:spPr>
+        <p:style>
+          <a:lnRef idx="1">
+            <a:schemeClr val="accent1"/>
+          </a:lnRef>
+          <a:fillRef idx="0">
+            <a:schemeClr val="accent1"/>
+          </a:fillRef>
+          <a:effectRef idx="0">
+            <a:schemeClr val="accent1"/>
+          </a:effectRef>
+          <a:fontRef idx="minor">
+            <a:schemeClr val="tx1"/>
+          </a:fontRef>
+        </p:style>
+      </p:cxnSp>
+      <p:cxnSp>
+        <p:nvCxnSpPr>
+          <p:cNvPr id="28" name="Straight Arrow Connector 27">
+            <a:extLst>
+              <a:ext uri="{FF2B5EF4-FFF2-40B4-BE49-F238E27FC236}">
+                <a16:creationId xmlns:a16="http://schemas.microsoft.com/office/drawing/2014/main" id="{B191C1E3-10DC-4A07-827A-530EB29BDA44}"/>
+              </a:ext>
+            </a:extLst>
+          </p:cNvPr>
+          <p:cNvCxnSpPr>
+            <a:cxnSpLocks/>
+            <a:stCxn id="37" idx="2"/>
+            <a:endCxn id="49" idx="0"/>
+          </p:cNvCxnSpPr>
+          <p:nvPr/>
+        </p:nvCxnSpPr>
+        <p:spPr>
+          <a:xfrm flipH="1">
+            <a:off x="6705093" y="4663711"/>
+            <a:ext cx="5509" cy="417102"/>
+          </a:xfrm>
+          <a:prstGeom prst="straightConnector1">
+            <a:avLst/>
+          </a:prstGeom>
+          <a:ln>
+            <a:tailEnd type="triangle"/>
+          </a:ln>
+        </p:spPr>
+        <p:style>
+          <a:lnRef idx="1">
+            <a:schemeClr val="accent1"/>
+          </a:lnRef>
+          <a:fillRef idx="0">
+            <a:schemeClr val="accent1"/>
+          </a:fillRef>
+          <a:effectRef idx="0">
+            <a:schemeClr val="accent1"/>
+          </a:effectRef>
+          <a:fontRef idx="minor">
+            <a:schemeClr val="tx1"/>
+          </a:fontRef>
+        </p:style>
+      </p:cxnSp>
+      <p:grpSp>
+        <p:nvGrpSpPr>
+          <p:cNvPr id="48" name="Group 47">
+            <a:extLst>
+              <a:ext uri="{FF2B5EF4-FFF2-40B4-BE49-F238E27FC236}">
+                <a16:creationId xmlns:a16="http://schemas.microsoft.com/office/drawing/2014/main" id="{1CA7A10E-E31F-4E60-87E8-7C235369A372}"/>
+              </a:ext>
+            </a:extLst>
+          </p:cNvPr>
+          <p:cNvGrpSpPr/>
+          <p:nvPr/>
+        </p:nvGrpSpPr>
+        <p:grpSpPr>
+          <a:xfrm>
+            <a:off x="6422135" y="5080813"/>
+            <a:ext cx="1093696" cy="500751"/>
+            <a:chOff x="5199529" y="340967"/>
+            <a:chExt cx="1093696" cy="500751"/>
+          </a:xfrm>
+        </p:grpSpPr>
+        <p:sp>
+          <p:nvSpPr>
+            <p:cNvPr id="49" name="Flowchart: Card 48">
+              <a:extLst>
+                <a:ext uri="{FF2B5EF4-FFF2-40B4-BE49-F238E27FC236}">
+                  <a16:creationId xmlns:a16="http://schemas.microsoft.com/office/drawing/2014/main" id="{12B088B5-F9C1-4087-A3C1-FE5A81FE0FBE}"/>
+                </a:ext>
+              </a:extLst>
+            </p:cNvPr>
+            <p:cNvSpPr/>
+            <p:nvPr/>
+          </p:nvSpPr>
+          <p:spPr>
+            <a:xfrm>
+              <a:off x="5327316" y="340967"/>
+              <a:ext cx="310342" cy="322730"/>
+            </a:xfrm>
+            <a:prstGeom prst="flowChartPunchedCard">
+              <a:avLst/>
+            </a:prstGeom>
+          </p:spPr>
+          <p:style>
+            <a:lnRef idx="2">
+              <a:schemeClr val="accent1">
+                <a:shade val="50000"/>
+              </a:schemeClr>
+            </a:lnRef>
+            <a:fillRef idx="1">
+              <a:schemeClr val="accent1"/>
+            </a:fillRef>
+            <a:effectRef idx="0">
+              <a:schemeClr val="accent1"/>
+            </a:effectRef>
+            <a:fontRef idx="minor">
+              <a:schemeClr val="lt1"/>
+            </a:fontRef>
+          </p:style>
+          <p:txBody>
+            <a:bodyPr rtlCol="0" anchor="ctr"/>
+            <a:lstStyle/>
+            <a:p>
+              <a:pPr algn="ctr"/>
+              <a:endParaRPr lang="en-US"/>
+            </a:p>
+          </p:txBody>
+        </p:sp>
+        <p:sp>
+          <p:nvSpPr>
+            <p:cNvPr id="50" name="TextBox 49">
+              <a:extLst>
+                <a:ext uri="{FF2B5EF4-FFF2-40B4-BE49-F238E27FC236}">
+                  <a16:creationId xmlns:a16="http://schemas.microsoft.com/office/drawing/2014/main" id="{BD96F6BB-FB10-43DA-BEC1-CB5B426208EC}"/>
+                </a:ext>
+              </a:extLst>
+            </p:cNvPr>
+            <p:cNvSpPr txBox="1"/>
+            <p:nvPr/>
+          </p:nvSpPr>
+          <p:spPr>
+            <a:xfrm>
+              <a:off x="5199529" y="595497"/>
+              <a:ext cx="1093696" cy="246221"/>
+            </a:xfrm>
+            <a:prstGeom prst="rect">
+              <a:avLst/>
+            </a:prstGeom>
+            <a:noFill/>
+          </p:spPr>
+          <p:txBody>
+            <a:bodyPr wrap="square" rtlCol="0">
+              <a:spAutoFit/>
+            </a:bodyPr>
+            <a:lstStyle/>
+            <a:p>
+              <a:r>
+                <a:rPr lang="en-US" sz="1000" dirty="0"/>
+                <a:t>../data/words.csv</a:t>
+              </a:r>
+            </a:p>
+          </p:txBody>
+        </p:sp>
+      </p:grpSp>
     </p:spTree>
     <p:extLst>
       <p:ext uri="{BB962C8B-B14F-4D97-AF65-F5344CB8AC3E}">

</xml_diff>